<commit_message>
updated poster with all the changes and updated class diagram
</commit_message>
<xml_diff>
--- a/Poster/poster_research_48x36_eecs_1.pptx
+++ b/Poster/poster_research_48x36_eecs_1.pptx
@@ -154,6 +154,14 @@
 </p:presentation>
 </file>
 
+<file path=ppt/revisionInfo.xml><?xml version="1.0" encoding="utf-8"?>
+<p1510:revInfo xmlns:a="http://schemas.openxmlformats.org/drawingml/2006/main" xmlns:r="http://schemas.openxmlformats.org/officeDocument/2006/relationships" xmlns:p1510="http://schemas.microsoft.com/office/powerpoint/2015/10/main">
+  <p1510:revLst>
+    <p1510:client id="{CFC63584-11B5-2B5D-E788-E69193F0B79E}" v="389" dt="2021-05-30T03:52:57.148"/>
+  </p1510:revLst>
+</p1510:revInfo>
+</file>
+
 <file path=ppt/handoutMasters/handoutMaster1.xml><?xml version="1.0" encoding="utf-8"?>
 <p:handoutMaster xmlns:a="http://schemas.openxmlformats.org/drawingml/2006/main" xmlns:r="http://schemas.openxmlformats.org/officeDocument/2006/relationships" xmlns:p="http://schemas.openxmlformats.org/presentationml/2006/main">
   <p:cSld>
@@ -240,7 +248,7 @@
               <a:rPr lang="en-US" smtClean="0">
                 <a:latin typeface="Verdana Regular" charset="0"/>
               </a:rPr>
-              <a:t>5/28/21</a:t>
+              <a:t>5/30/21</a:t>
             </a:fld>
             <a:endParaRPr lang="en-US" dirty="0">
               <a:latin typeface="Verdana Regular" charset="0"/>
@@ -418,7 +426,7 @@
             <a:fld id="{9CF59EBC-EC05-6B4D-B166-DDFA6A1EDCB6}" type="datetimeFigureOut">
               <a:rPr lang="en-US" smtClean="0"/>
               <a:pPr/>
-              <a:t>5/28/21</a:t>
+              <a:t>5/30/21</a:t>
             </a:fld>
             <a:endParaRPr lang="en-US" dirty="0"/>
           </a:p>
@@ -1514,36 +1522,6 @@
           <a:chExt cx="0" cy="0"/>
         </a:xfrm>
       </p:grpSpPr>
-      <p:pic>
-        <p:nvPicPr>
-          <p:cNvPr id="23" name="Picture Placeholder 22" descr="Diagram&#10;&#10;Description automatically generated">
-            <a:extLst>
-              <a:ext uri="{FF2B5EF4-FFF2-40B4-BE49-F238E27FC236}">
-                <a16:creationId xmlns:a16="http://schemas.microsoft.com/office/drawing/2014/main" id="{089C3B53-9049-664E-8949-AD1808EDD7DE}"/>
-              </a:ext>
-            </a:extLst>
-          </p:cNvPr>
-          <p:cNvPicPr>
-            <a:picLocks noGrp="1" noChangeAspect="1"/>
-          </p:cNvPicPr>
-          <p:nvPr>
-            <p:ph type="pic" sz="quarter" idx="11"/>
-          </p:nvPr>
-        </p:nvPicPr>
-        <p:blipFill>
-          <a:blip r:embed="rId2"/>
-          <a:srcRect t="59" b="59"/>
-          <a:stretch>
-            <a:fillRect/>
-          </a:stretch>
-        </p:blipFill>
-        <p:spPr>
-          <a:xfrm>
-            <a:off x="26932714" y="9846939"/>
-            <a:ext cx="15026498" cy="14503653"/>
-          </a:xfrm>
-        </p:spPr>
-      </p:pic>
       <p:sp>
         <p:nvSpPr>
           <p:cNvPr id="5" name="Text Placeholder 16"/>
@@ -1554,7 +1532,7 @@
         </p:nvSpPr>
         <p:spPr>
           <a:xfrm>
-            <a:off x="11392076" y="21197344"/>
+            <a:off x="11392076" y="20679759"/>
             <a:ext cx="9418320" cy="664797"/>
           </a:xfrm>
           <a:prstGeom prst="rect">
@@ -1754,15 +1732,15 @@
         </p:nvSpPr>
         <p:spPr>
           <a:xfrm>
-            <a:off x="11392076" y="21942797"/>
-            <a:ext cx="11071826" cy="11660885"/>
+            <a:off x="11392076" y="21425212"/>
+            <a:ext cx="11071826" cy="12096966"/>
           </a:xfrm>
           <a:prstGeom prst="rect">
             <a:avLst/>
           </a:prstGeom>
         </p:spPr>
         <p:txBody>
-          <a:bodyPr wrap="square" lIns="0" tIns="0" rIns="0" bIns="0">
+          <a:bodyPr wrap="square" lIns="0" tIns="0" rIns="0" bIns="0" anchor="t">
             <a:spAutoFit/>
           </a:bodyPr>
           <a:lstStyle>
@@ -1941,27 +1919,43 @@
             </a:pPr>
             <a:r>
               <a:rPr lang="en-US" dirty="0">
-                <a:latin typeface="Verdana" charset="0"/>
-                <a:ea typeface="Verdana" charset="0"/>
-                <a:cs typeface="Verdana" charset="0"/>
+                <a:latin typeface="Verdana"/>
+                <a:ea typeface="Verdana"/>
+                <a:cs typeface="Verdana"/>
               </a:rPr>
               <a:t>We decided to use the Simple </a:t>
             </a:r>
             <a:r>
               <a:rPr lang="en-US" dirty="0" err="1">
-                <a:latin typeface="Verdana" charset="0"/>
-                <a:ea typeface="Verdana" charset="0"/>
-                <a:cs typeface="Verdana" charset="0"/>
+                <a:latin typeface="Verdana"/>
+                <a:ea typeface="Verdana"/>
+                <a:cs typeface="Verdana"/>
               </a:rPr>
               <a:t>DirectMedia</a:t>
             </a:r>
             <a:r>
               <a:rPr lang="en-US" dirty="0">
-                <a:latin typeface="Verdana" charset="0"/>
-                <a:ea typeface="Verdana" charset="0"/>
-                <a:cs typeface="Verdana" charset="0"/>
+                <a:latin typeface="Verdana"/>
+                <a:ea typeface="Verdana"/>
+                <a:cs typeface="Verdana"/>
               </a:rPr>
-              <a:t> Layer as our frontend graphical interface. It was a perfect fit for our project because it is a cross-platform programming library that uses OpenGL and Direct3D. In addition, it provided us with low-level access to your audio, keyboard, mouse, joystick, and graphics hardware. This was crucial because we wanted the ability to connect controllers such as an Xbox controller.</a:t>
+              <a:t> Layer as our frontend graphical interface. It was a perfect fit for our project because it is a cross-platform programming library that uses OpenGL and Direct3D. In addition, it provided us with low-level access to the audio, keyboard, mouse, joystick, and graphics hardware. This was crucial because we wanted the ability to connect controllers such as an </a:t>
+            </a:r>
+            <a:r>
+              <a:rPr lang="en-US" dirty="0" err="1">
+                <a:latin typeface="Verdana"/>
+                <a:ea typeface="Verdana"/>
+                <a:cs typeface="Verdana"/>
+              </a:rPr>
+              <a:t>XBox</a:t>
+            </a:r>
+            <a:r>
+              <a:rPr lang="en-US" dirty="0">
+                <a:latin typeface="Verdana"/>
+                <a:ea typeface="Verdana"/>
+                <a:cs typeface="Verdana"/>
+              </a:rPr>
+              <a:t> controller.</a:t>
             </a:r>
           </a:p>
           <a:p>
@@ -1972,11 +1966,31 @@
             </a:pPr>
             <a:r>
               <a:rPr lang="en-US" dirty="0">
-                <a:latin typeface="Verdana" charset="0"/>
-                <a:ea typeface="Verdana" charset="0"/>
-                <a:cs typeface="Verdana" charset="0"/>
+                <a:latin typeface="Verdana"/>
+                <a:ea typeface="Verdana"/>
+                <a:cs typeface="Verdana"/>
               </a:rPr>
-              <a:t>Another important tool that was very helpful in both building and testing the opcodes was Microsoft Excel. We were able to automate many opcode functions and create a solid skeleton code using Microsoft Excel. Later it was transferred into our code where the functions were fully implemented and tested. </a:t>
+              <a:t>Another important tool that was very helpful in both building and testing the opcodes was Microsoft Excel. We were able to automate many opcode functions and create a solid skeleton code using Microsoft Excel. Later it was transferred into our code where the functions were then fully implemented and tested. </a:t>
+            </a:r>
+            <a:endParaRPr lang="en-US" dirty="0">
+              <a:latin typeface="Verdana" charset="0"/>
+              <a:ea typeface="Verdana" charset="0"/>
+              <a:cs typeface="Verdana" charset="0"/>
+            </a:endParaRPr>
+          </a:p>
+          <a:p>
+            <a:pPr>
+              <a:spcAft>
+                <a:spcPts val="2600"/>
+              </a:spcAft>
+            </a:pPr>
+            <a:r>
+              <a:rPr lang="en-US" dirty="0">
+                <a:latin typeface="Verdana"/>
+                <a:ea typeface="Verdana"/>
+                <a:cs typeface="Verdana"/>
+              </a:rPr>
+              <a:t>A GitHub repository was used to keep track of all our work and to have a strong version control in case of any accidents. The overall result was  173 commits to Master, 24 pull requests, and many branches have been made.</a:t>
             </a:r>
           </a:p>
           <a:p>
@@ -1987,35 +2001,17 @@
             </a:pPr>
             <a:r>
               <a:rPr lang="en-US" dirty="0">
-                <a:latin typeface="Verdana" charset="0"/>
-                <a:ea typeface="Verdana" charset="0"/>
-                <a:cs typeface="Verdana" charset="0"/>
+                <a:latin typeface="Verdana"/>
+                <a:ea typeface="Verdana"/>
+                <a:cs typeface="Verdana"/>
               </a:rPr>
-              <a:t>GitHub repository to keep track of all our work and have a strong version control in case of any accidents. The overall result was  173 commits to Master, 24 pull requests, and many branches have been made.</a:t>
+              <a:t>Inno Setup with Visual Studio allowed us to create a setup file for the release candidate. The script was written so the user will only have to click the setup and the program will install all the necessary files needed to run the emulator. </a:t>
             </a:r>
-          </a:p>
-          <a:p>
-            <a:pPr>
-              <a:spcAft>
-                <a:spcPts val="2600"/>
-              </a:spcAft>
-            </a:pPr>
-            <a:r>
-              <a:rPr lang="en-US" dirty="0" err="1">
-                <a:latin typeface="Verdana" charset="0"/>
-                <a:ea typeface="Verdana" charset="0"/>
-                <a:cs typeface="Verdana" charset="0"/>
-              </a:rPr>
-              <a:t>Inno</a:t>
-            </a:r>
-            <a:r>
-              <a:rPr lang="en-US" dirty="0">
-                <a:latin typeface="Verdana" charset="0"/>
-                <a:ea typeface="Verdana" charset="0"/>
-                <a:cs typeface="Verdana" charset="0"/>
-              </a:rPr>
-              <a:t> Setup with Visual Studio allows us to create a setup file for the release candidate. The script was written so the user will only have to click the setup and the program will install all the necessary files needed to run the emulator. </a:t>
-            </a:r>
+            <a:endParaRPr lang="en-US" dirty="0">
+              <a:latin typeface="Verdana" charset="0"/>
+              <a:ea typeface="Verdana" charset="0"/>
+              <a:cs typeface="Verdana" charset="0"/>
+            </a:endParaRPr>
           </a:p>
           <a:p>
             <a:pPr>
@@ -2264,7 +2260,7 @@
           </a:prstGeom>
         </p:spPr>
         <p:txBody>
-          <a:bodyPr wrap="square" lIns="0" tIns="0" rIns="0" bIns="0">
+          <a:bodyPr wrap="square" lIns="0" tIns="0" rIns="0" bIns="0" anchor="t">
             <a:spAutoFit/>
           </a:bodyPr>
           <a:lstStyle>
@@ -2458,11 +2454,11 @@
             </a:pPr>
             <a:r>
               <a:rPr lang="en-US" dirty="0">
-                <a:latin typeface="Verdana" charset="0"/>
-                <a:ea typeface="Verdana" charset="0"/>
-                <a:cs typeface="Verdana" charset="0"/>
+                <a:latin typeface="Verdana"/>
+                <a:ea typeface="Verdana"/>
+                <a:cs typeface="Verdana"/>
               </a:rPr>
-              <a:t>Created a GUI interface for the emulator was created using SDL2.</a:t>
+              <a:t>Created a GUI interface for the emulator that was created using SDL2.</a:t>
             </a:r>
           </a:p>
           <a:p>
@@ -2473,11 +2469,11 @@
             </a:pPr>
             <a:r>
               <a:rPr lang="en-US" dirty="0">
-                <a:latin typeface="Verdana" charset="0"/>
-                <a:ea typeface="Verdana" charset="0"/>
-                <a:cs typeface="Verdana" charset="0"/>
+                <a:latin typeface="Verdana"/>
+                <a:ea typeface="Verdana"/>
+                <a:cs typeface="Verdana"/>
               </a:rPr>
-              <a:t>The i8080 emulator is capable of running and decrypting the assembly code from the Space Invaders game. The original rom files are used to run the game.</a:t>
+              <a:t>The i8080 emulator is capable of running and decrypting the assembly code from the Space Invaders game. The original ROM files are used to run the game.</a:t>
             </a:r>
           </a:p>
           <a:p>
@@ -2534,15 +2530,15 @@
         </p:nvSpPr>
         <p:spPr>
           <a:xfrm>
-            <a:off x="1931988" y="6258905"/>
-            <a:ext cx="8103881" cy="8916543"/>
+            <a:off x="1649096" y="5816225"/>
+            <a:ext cx="8386774" cy="9352625"/>
           </a:xfrm>
           <a:prstGeom prst="rect">
             <a:avLst/>
           </a:prstGeom>
         </p:spPr>
         <p:txBody>
-          <a:bodyPr wrap="square" lIns="0" tIns="0" rIns="0" bIns="0">
+          <a:bodyPr wrap="square" lIns="0" tIns="0" rIns="0" bIns="0" anchor="t">
             <a:spAutoFit/>
           </a:bodyPr>
           <a:lstStyle>
@@ -2727,12 +2723,20 @@
                 <a:solidFill>
                   <a:schemeClr val="bg1"/>
                 </a:solidFill>
-                <a:latin typeface="Verdana" charset="0"/>
-                <a:ea typeface="Verdana" charset="0"/>
-                <a:cs typeface="Verdana" charset="0"/>
+                <a:latin typeface="Verdana"/>
+                <a:ea typeface="Verdana"/>
+                <a:cs typeface="Verdana"/>
               </a:rPr>
-              <a:t>In general terms, our program is an emulator that is built on C++. The user is given the chance to load the space invaders game inside the built environment to be run on modern hardware. </a:t>
+              <a:t>In general terms, our program is an emulator that is built on C++. The user is given the chance to load the Space Invaders game inside a virtual processor environment to be run on modern hardware. </a:t>
             </a:r>
+            <a:endParaRPr lang="en-US" dirty="0">
+              <a:solidFill>
+                <a:schemeClr val="bg1"/>
+              </a:solidFill>
+              <a:latin typeface="Verdana" charset="0"/>
+              <a:ea typeface="Verdana" charset="0"/>
+              <a:cs typeface="Verdana" charset="0"/>
+            </a:endParaRPr>
           </a:p>
           <a:p>
             <a:pPr>
@@ -2745,12 +2749,20 @@
                 <a:solidFill>
                   <a:schemeClr val="bg1"/>
                 </a:solidFill>
-                <a:latin typeface="Verdana" charset="0"/>
-                <a:ea typeface="Verdana" charset="0"/>
-                <a:cs typeface="Verdana" charset="0"/>
+                <a:latin typeface="Verdana"/>
+                <a:ea typeface="Verdana"/>
+                <a:cs typeface="Verdana"/>
               </a:rPr>
-              <a:t>The GUI is built to run on Windows, yet SDL2 can be compiled on any device. This project introduced us to a slew of new frameworks and the C/C++ language.  Our project used a heavy amount of version control, and object-oriented programming.  </a:t>
+              <a:t>The GUI is built to run on Windows, yet SDL2 can be compiled on any device. This project introduced us to and gave us more experience with a slew of new frameworks and the C/C++ language.  Our project used a heavy amount of version control and object-oriented programming.  </a:t>
             </a:r>
+            <a:endParaRPr lang="en-US" dirty="0">
+              <a:solidFill>
+                <a:schemeClr val="bg1"/>
+              </a:solidFill>
+              <a:latin typeface="Verdana" charset="0"/>
+              <a:ea typeface="Verdana" charset="0"/>
+              <a:cs typeface="Verdana" charset="0"/>
+            </a:endParaRPr>
           </a:p>
           <a:p>
             <a:pPr>
@@ -2763,12 +2775,20 @@
                 <a:solidFill>
                   <a:schemeClr val="bg1"/>
                 </a:solidFill>
-                <a:latin typeface="Verdana" charset="0"/>
-                <a:ea typeface="Verdana" charset="0"/>
-                <a:cs typeface="Verdana" charset="0"/>
+                <a:latin typeface="Verdana"/>
+                <a:ea typeface="Verdana"/>
+                <a:cs typeface="Verdana"/>
               </a:rPr>
-              <a:t>There were many steep learning curves where we had to design the GUI using SDL2 library, sharpening our skills with C++ and understanding the assembly language. On many occasions there were days of debugging and research. </a:t>
+              <a:t>There were many steep learning curves where we had to design the GUI using the SDL2 library, sharpen our skills with C++, understanding the assembly language and architecture of the Intel 8080 processor. On many occasions there were days of debugging and research. </a:t>
             </a:r>
+            <a:endParaRPr lang="en-US" dirty="0">
+              <a:solidFill>
+                <a:schemeClr val="bg1"/>
+              </a:solidFill>
+              <a:latin typeface="Verdana" charset="0"/>
+              <a:ea typeface="Verdana" charset="0"/>
+              <a:cs typeface="Verdana" charset="0"/>
+            </a:endParaRPr>
           </a:p>
         </p:txBody>
       </p:sp>
@@ -2837,7 +2857,7 @@
         </p:nvSpPr>
         <p:spPr>
           <a:xfrm>
-            <a:off x="1964266" y="5340107"/>
+            <a:off x="1964266" y="4840704"/>
             <a:ext cx="8071603" cy="664797"/>
           </a:xfrm>
           <a:prstGeom prst="rect">
@@ -3042,7 +3062,7 @@
           <p:nvPr/>
         </p:nvPicPr>
         <p:blipFill>
-          <a:blip r:embed="rId3">
+          <a:blip r:embed="rId2">
             <a:extLst>
               <a:ext uri="{28A0092B-C50C-407E-A947-70E740481C1C}">
                 <a14:useLocalDpi xmlns:a14="http://schemas.microsoft.com/office/drawing/2010/main" val="0"/>
@@ -3090,15 +3110,15 @@
         </p:nvSpPr>
         <p:spPr>
           <a:xfrm>
-            <a:off x="1931988" y="25748610"/>
-            <a:ext cx="8785196" cy="2376292"/>
+            <a:off x="1931988" y="25231025"/>
+            <a:ext cx="8785196" cy="3277820"/>
           </a:xfrm>
           <a:prstGeom prst="rect">
             <a:avLst/>
           </a:prstGeom>
         </p:spPr>
         <p:txBody>
-          <a:bodyPr wrap="square" lIns="0" tIns="0" rIns="0" bIns="0">
+          <a:bodyPr wrap="square" lIns="0" tIns="0" rIns="0" bIns="0" anchor="t">
             <a:spAutoFit/>
           </a:bodyPr>
           <a:lstStyle>
@@ -3278,7 +3298,7 @@
                 <a:spcPct val="100000"/>
               </a:lnSpc>
               <a:spcAft>
-                <a:spcPts val="2600"/>
+                <a:spcPts val="1800"/>
               </a:spcAft>
             </a:pPr>
             <a:r>
@@ -3286,11 +3306,37 @@
                 <a:solidFill>
                   <a:schemeClr val="bg1"/>
                 </a:solidFill>
-                <a:latin typeface="Verdana" charset="0"/>
-                <a:ea typeface="Verdana" charset="0"/>
-                <a:cs typeface="Verdana" charset="0"/>
+                <a:latin typeface="Verdana"/>
+                <a:ea typeface="Verdana"/>
+                <a:cs typeface="Verdana"/>
               </a:rPr>
-              <a:t>The emulator has the ability to to play the Space invaders with two people.</a:t>
+              <a:t>The emulator runs the original ROM as it would have in an arcade.</a:t>
+            </a:r>
+            <a:endParaRPr lang="en-US">
+              <a:solidFill>
+                <a:schemeClr val="bg1"/>
+              </a:solidFill>
+            </a:endParaRPr>
+          </a:p>
+          <a:p>
+            <a:pPr>
+              <a:lnSpc>
+                <a:spcPct val="100000"/>
+              </a:lnSpc>
+              <a:spcAft>
+                <a:spcPts val="1800"/>
+              </a:spcAft>
+            </a:pPr>
+            <a:r>
+              <a:rPr lang="en-US" dirty="0">
+                <a:solidFill>
+                  <a:schemeClr val="bg1"/>
+                </a:solidFill>
+                <a:latin typeface="Verdana"/>
+                <a:ea typeface="Verdana"/>
+                <a:cs typeface="Verdana"/>
+              </a:rPr>
+              <a:t>It has the ability to run Space Invaders for two players.</a:t>
             </a:r>
           </a:p>
           <a:p>
@@ -3299,7 +3345,7 @@
                 <a:spcPct val="100000"/>
               </a:lnSpc>
               <a:spcAft>
-                <a:spcPts val="2600"/>
+                <a:spcPts val="1800"/>
               </a:spcAft>
             </a:pPr>
             <a:r>
@@ -3307,12 +3353,20 @@
                 <a:solidFill>
                   <a:schemeClr val="bg1"/>
                 </a:solidFill>
-                <a:latin typeface="Verdana" charset="0"/>
-                <a:ea typeface="Verdana" charset="0"/>
-                <a:cs typeface="Verdana" charset="0"/>
+                <a:latin typeface="Verdana"/>
+                <a:ea typeface="Verdana"/>
+                <a:cs typeface="Verdana"/>
               </a:rPr>
-              <a:t>Controller input is available. </a:t>
+              <a:t>Controller input is available. </a:t>
             </a:r>
+            <a:endParaRPr lang="en-US">
+              <a:solidFill>
+                <a:schemeClr val="bg1"/>
+              </a:solidFill>
+              <a:latin typeface="Verdana" charset="0"/>
+              <a:ea typeface="Verdana" charset="0"/>
+              <a:cs typeface="Verdana" charset="0"/>
+            </a:endParaRPr>
           </a:p>
           <a:p>
             <a:pPr>
@@ -3320,7 +3374,7 @@
                 <a:spcPct val="100000"/>
               </a:lnSpc>
               <a:spcAft>
-                <a:spcPts val="2600"/>
+                <a:spcPts val="1800"/>
               </a:spcAft>
             </a:pPr>
             <a:r>
@@ -3328,9 +3382,9 @@
                 <a:solidFill>
                   <a:schemeClr val="bg1"/>
                 </a:solidFill>
-                <a:latin typeface="Verdana" charset="0"/>
-                <a:ea typeface="Verdana" charset="0"/>
-                <a:cs typeface="Verdana" charset="0"/>
+                <a:latin typeface="Verdana"/>
+                <a:ea typeface="Verdana"/>
+                <a:cs typeface="Verdana"/>
               </a:rPr>
               <a:t>Controls are shown above</a:t>
             </a:r>
@@ -3788,7 +3842,7 @@
           </p:nvPr>
         </p:nvPicPr>
         <p:blipFill>
-          <a:blip r:embed="rId4">
+          <a:blip r:embed="rId3">
             <a:extLst>
               <a:ext uri="{28A0092B-C50C-407E-A947-70E740481C1C}">
                 <a14:useLocalDpi xmlns:a14="http://schemas.microsoft.com/office/drawing/2010/main" val="0"/>
@@ -3836,7 +3890,7 @@
         </p:nvSpPr>
         <p:spPr>
           <a:xfrm>
-            <a:off x="27492855" y="8963305"/>
+            <a:off x="27492855" y="7703311"/>
             <a:ext cx="19385773" cy="677108"/>
           </a:xfrm>
           <a:prstGeom prst="rect">
@@ -4500,6 +4554,36 @@
           </a:p>
         </p:txBody>
       </p:sp>
+      <p:pic>
+        <p:nvPicPr>
+          <p:cNvPr id="17" name="Picture 16" descr="Diagram&#10;&#10;Description automatically generated">
+            <a:extLst>
+              <a:ext uri="{FF2B5EF4-FFF2-40B4-BE49-F238E27FC236}">
+                <a16:creationId xmlns:a16="http://schemas.microsoft.com/office/drawing/2014/main" id="{A8D5B437-60C2-7345-A160-DF9659381FA2}"/>
+              </a:ext>
+            </a:extLst>
+          </p:cNvPr>
+          <p:cNvPicPr>
+            <a:picLocks noChangeAspect="1"/>
+          </p:cNvPicPr>
+          <p:nvPr/>
+        </p:nvPicPr>
+        <p:blipFill>
+          <a:blip r:embed="rId4"/>
+          <a:stretch>
+            <a:fillRect/>
+          </a:stretch>
+        </p:blipFill>
+        <p:spPr>
+          <a:xfrm>
+            <a:off x="26775847" y="8642710"/>
+            <a:ext cx="14794184" cy="15836593"/>
+          </a:xfrm>
+          <a:prstGeom prst="rect">
+            <a:avLst/>
+          </a:prstGeom>
+        </p:spPr>
+      </p:pic>
     </p:spTree>
     <p:extLst>
       <p:ext uri="{BB962C8B-B14F-4D97-AF65-F5344CB8AC3E}">

</xml_diff>